<commit_message>
added arrow from likelihood to optimize
</commit_message>
<xml_diff>
--- a/src/static/GPR_workflow.pptx
+++ b/src/static/GPR_workflow.pptx
@@ -7223,6 +7223,37 @@
           </a:p>
         </p:txBody>
       </p:sp>
+      <p:cxnSp>
+        <p:nvCxnSpPr>
+          <p:cNvPr id="107" name="Google Shape;107;p13"/>
+          <p:cNvCxnSpPr>
+            <a:stCxn id="85" idx="3"/>
+            <a:endCxn id="55" idx="1"/>
+          </p:cNvCxnSpPr>
+          <p:nvPr/>
+        </p:nvCxnSpPr>
+        <p:spPr>
+          <a:xfrm flipH="1" rot="10800000">
+            <a:off x="4196079" y="2734062"/>
+            <a:ext cx="529500" cy="1210500"/>
+          </a:xfrm>
+          <a:prstGeom prst="curvedConnector3">
+            <a:avLst>
+              <a:gd fmla="val 49993" name="adj1"/>
+            </a:avLst>
+          </a:prstGeom>
+          <a:noFill/>
+          <a:ln cap="flat" cmpd="sng" w="9525">
+            <a:solidFill>
+              <a:schemeClr val="dk2"/>
+            </a:solidFill>
+            <a:prstDash val="solid"/>
+            <a:round/>
+            <a:headEnd len="med" w="med" type="none"/>
+            <a:tailEnd len="med" w="med" type="triangle"/>
+          </a:ln>
+        </p:spPr>
+      </p:cxnSp>
     </p:spTree>
   </p:cSld>
   <p:clrMapOvr>

</xml_diff>

<commit_message>
fixed small bugs in GPR_PGM (#7)
* fixed small bugs in GPR_PGM

* [pre-commit.ci] auto fixes from pre-commit.com hooks

for more information, see https://pre-commit.ci

* added arrow from likelihood to optimize

Co-authored-by: pre-commit-ci[bot] <66853113+pre-commit-ci[bot]@users.noreply.github.com>
</commit_message>
<xml_diff>
--- a/src/static/GPR_workflow.pptx
+++ b/src/static/GPR_workflow.pptx
@@ -7223,6 +7223,37 @@
           </a:p>
         </p:txBody>
       </p:sp>
+      <p:cxnSp>
+        <p:nvCxnSpPr>
+          <p:cNvPr id="107" name="Google Shape;107;p13"/>
+          <p:cNvCxnSpPr>
+            <a:stCxn id="85" idx="3"/>
+            <a:endCxn id="55" idx="1"/>
+          </p:cNvCxnSpPr>
+          <p:nvPr/>
+        </p:nvCxnSpPr>
+        <p:spPr>
+          <a:xfrm flipH="1" rot="10800000">
+            <a:off x="4196079" y="2734062"/>
+            <a:ext cx="529500" cy="1210500"/>
+          </a:xfrm>
+          <a:prstGeom prst="curvedConnector3">
+            <a:avLst>
+              <a:gd fmla="val 49993" name="adj1"/>
+            </a:avLst>
+          </a:prstGeom>
+          <a:noFill/>
+          <a:ln cap="flat" cmpd="sng" w="9525">
+            <a:solidFill>
+              <a:schemeClr val="dk2"/>
+            </a:solidFill>
+            <a:prstDash val="solid"/>
+            <a:round/>
+            <a:headEnd len="med" w="med" type="none"/>
+            <a:tailEnd len="med" w="med" type="triangle"/>
+          </a:ln>
+        </p:spPr>
+      </p:cxnSp>
     </p:spTree>
   </p:cSld>
   <p:clrMapOvr>

</xml_diff>